<commit_message>
- Add video of the app usage in the actual lab - Update poster with QR code
</commit_message>
<xml_diff>
--- a/Poster.pptx
+++ b/Poster.pptx
@@ -261,7 +261,7 @@
           <a:p>
             <a:fld id="{F6CDF056-1887-476A-B91A-DCA7A6043C8A}" type="datetimeFigureOut">
               <a:rPr lang="he-IL" smtClean="0"/>
-              <a:t>ל'/ניסן/תשפ"ד</a:t>
+              <a:t>י"א/אייר/תשפ"ד</a:t>
             </a:fld>
             <a:endParaRPr lang="he-IL"/>
           </a:p>
@@ -461,7 +461,7 @@
           <a:p>
             <a:fld id="{F6CDF056-1887-476A-B91A-DCA7A6043C8A}" type="datetimeFigureOut">
               <a:rPr lang="he-IL" smtClean="0"/>
-              <a:t>ל'/ניסן/תשפ"ד</a:t>
+              <a:t>י"א/אייר/תשפ"ד</a:t>
             </a:fld>
             <a:endParaRPr lang="he-IL"/>
           </a:p>
@@ -671,7 +671,7 @@
           <a:p>
             <a:fld id="{F6CDF056-1887-476A-B91A-DCA7A6043C8A}" type="datetimeFigureOut">
               <a:rPr lang="he-IL" smtClean="0"/>
-              <a:t>ל'/ניסן/תשפ"ד</a:t>
+              <a:t>י"א/אייר/תשפ"ד</a:t>
             </a:fld>
             <a:endParaRPr lang="he-IL"/>
           </a:p>
@@ -871,7 +871,7 @@
           <a:p>
             <a:fld id="{F6CDF056-1887-476A-B91A-DCA7A6043C8A}" type="datetimeFigureOut">
               <a:rPr lang="he-IL" smtClean="0"/>
-              <a:t>ל'/ניסן/תשפ"ד</a:t>
+              <a:t>י"א/אייר/תשפ"ד</a:t>
             </a:fld>
             <a:endParaRPr lang="he-IL"/>
           </a:p>
@@ -1147,7 +1147,7 @@
           <a:p>
             <a:fld id="{F6CDF056-1887-476A-B91A-DCA7A6043C8A}" type="datetimeFigureOut">
               <a:rPr lang="he-IL" smtClean="0"/>
-              <a:t>ל'/ניסן/תשפ"ד</a:t>
+              <a:t>י"א/אייר/תשפ"ד</a:t>
             </a:fld>
             <a:endParaRPr lang="he-IL"/>
           </a:p>
@@ -1415,7 +1415,7 @@
           <a:p>
             <a:fld id="{F6CDF056-1887-476A-B91A-DCA7A6043C8A}" type="datetimeFigureOut">
               <a:rPr lang="he-IL" smtClean="0"/>
-              <a:t>ל'/ניסן/תשפ"ד</a:t>
+              <a:t>י"א/אייר/תשפ"ד</a:t>
             </a:fld>
             <a:endParaRPr lang="he-IL"/>
           </a:p>
@@ -1830,7 +1830,7 @@
           <a:p>
             <a:fld id="{F6CDF056-1887-476A-B91A-DCA7A6043C8A}" type="datetimeFigureOut">
               <a:rPr lang="he-IL" smtClean="0"/>
-              <a:t>ל'/ניסן/תשפ"ד</a:t>
+              <a:t>י"א/אייר/תשפ"ד</a:t>
             </a:fld>
             <a:endParaRPr lang="he-IL"/>
           </a:p>
@@ -1972,7 +1972,7 @@
           <a:p>
             <a:fld id="{F6CDF056-1887-476A-B91A-DCA7A6043C8A}" type="datetimeFigureOut">
               <a:rPr lang="he-IL" smtClean="0"/>
-              <a:t>ל'/ניסן/תשפ"ד</a:t>
+              <a:t>י"א/אייר/תשפ"ד</a:t>
             </a:fld>
             <a:endParaRPr lang="he-IL"/>
           </a:p>
@@ -2085,7 +2085,7 @@
           <a:p>
             <a:fld id="{F6CDF056-1887-476A-B91A-DCA7A6043C8A}" type="datetimeFigureOut">
               <a:rPr lang="he-IL" smtClean="0"/>
-              <a:t>ל'/ניסן/תשפ"ד</a:t>
+              <a:t>י"א/אייר/תשפ"ד</a:t>
             </a:fld>
             <a:endParaRPr lang="he-IL"/>
           </a:p>
@@ -2398,7 +2398,7 @@
           <a:p>
             <a:fld id="{F6CDF056-1887-476A-B91A-DCA7A6043C8A}" type="datetimeFigureOut">
               <a:rPr lang="he-IL" smtClean="0"/>
-              <a:t>ל'/ניסן/תשפ"ד</a:t>
+              <a:t>י"א/אייר/תשפ"ד</a:t>
             </a:fld>
             <a:endParaRPr lang="he-IL"/>
           </a:p>
@@ -2687,7 +2687,7 @@
           <a:p>
             <a:fld id="{F6CDF056-1887-476A-B91A-DCA7A6043C8A}" type="datetimeFigureOut">
               <a:rPr lang="he-IL" smtClean="0"/>
-              <a:t>ל'/ניסן/תשפ"ד</a:t>
+              <a:t>י"א/אייר/תשפ"ד</a:t>
             </a:fld>
             <a:endParaRPr lang="he-IL"/>
           </a:p>
@@ -2930,7 +2930,7 @@
           <a:p>
             <a:fld id="{F6CDF056-1887-476A-B91A-DCA7A6043C8A}" type="datetimeFigureOut">
               <a:rPr lang="he-IL" smtClean="0"/>
-              <a:t>ל'/ניסן/תשפ"ד</a:t>
+              <a:t>י"א/אייר/תשפ"ד</a:t>
             </a:fld>
             <a:endParaRPr lang="he-IL"/>
           </a:p>
@@ -3365,8 +3365,8 @@
         </p:nvSpPr>
         <p:spPr>
           <a:xfrm>
-            <a:off x="1524000" y="774891"/>
-            <a:ext cx="9144000" cy="1410525"/>
+            <a:off x="348343" y="651268"/>
+            <a:ext cx="8311025" cy="1410525"/>
           </a:xfrm>
         </p:spPr>
         <p:txBody>
@@ -3375,6 +3375,7 @@
           </a:bodyPr>
           <a:lstStyle/>
           <a:p>
+            <a:pPr algn="l"/>
             <a:r>
               <a:rPr lang="en-US" b="1" dirty="0"/>
               <a:t>Sensor name: PQ3834-00</a:t>
@@ -3507,8 +3508,44 @@
         </p:blipFill>
         <p:spPr>
           <a:xfrm>
-            <a:off x="5280408" y="2889504"/>
-            <a:ext cx="6362230" cy="2867483"/>
+            <a:off x="5887185" y="3639312"/>
+            <a:ext cx="5956472" cy="2684604"/>
+          </a:xfrm>
+          <a:prstGeom prst="rect">
+            <a:avLst/>
+          </a:prstGeom>
+        </p:spPr>
+      </p:pic>
+      <p:pic>
+        <p:nvPicPr>
+          <p:cNvPr id="5" name="Picture 4" descr="A qr code on a black background&#10;&#10;Description automatically generated">
+            <a:extLst>
+              <a:ext uri="{FF2B5EF4-FFF2-40B4-BE49-F238E27FC236}">
+                <a16:creationId xmlns:a16="http://schemas.microsoft.com/office/drawing/2014/main" id="{5C492476-7110-6DED-A890-3398FBCC1C03}"/>
+              </a:ext>
+            </a:extLst>
+          </p:cNvPr>
+          <p:cNvPicPr>
+            <a:picLocks noChangeAspect="1"/>
+          </p:cNvPicPr>
+          <p:nvPr/>
+        </p:nvPicPr>
+        <p:blipFill>
+          <a:blip r:embed="rId3">
+            <a:extLst>
+              <a:ext uri="{28A0092B-C50C-407E-A947-70E740481C1C}">
+                <a14:useLocalDpi xmlns:a14="http://schemas.microsoft.com/office/drawing/2010/main" val="0"/>
+              </a:ext>
+            </a:extLst>
+          </a:blip>
+          <a:stretch>
+            <a:fillRect/>
+          </a:stretch>
+        </p:blipFill>
+        <p:spPr>
+          <a:xfrm>
+            <a:off x="9268653" y="154787"/>
+            <a:ext cx="2575004" cy="3346704"/>
           </a:xfrm>
           <a:prstGeom prst="rect">
             <a:avLst/>

</xml_diff>